<commit_message>
Added presentations for clean code and unit testing, and data wrangling
</commit_message>
<xml_diff>
--- a/presentations/Fundamental Big Data Analysis & Science - Introduction.pptx
+++ b/presentations/Fundamental Big Data Analysis & Science - Introduction.pptx
@@ -6389,6 +6389,30 @@
           <a:p>
             <a:r>
               <a:rPr lang="en-US" dirty="0"/>
+              <a:t>Talk: Data wrangling</a:t>
+            </a:r>
+          </a:p>
+          <a:p>
+            <a:pPr lvl="1"/>
+            <a:r>
+              <a:rPr lang="en-US" dirty="0"/>
+              <a:t>What is it?</a:t>
+            </a:r>
+          </a:p>
+          <a:p>
+            <a:pPr lvl="1"/>
+            <a:r>
+              <a:rPr lang="en-US" dirty="0"/>
+              <a:t>Why do we need it?</a:t>
+            </a:r>
+          </a:p>
+          <a:p>
+            <a:pPr lvl="1"/>
+            <a:endParaRPr lang="en-US" dirty="0"/>
+          </a:p>
+          <a:p>
+            <a:r>
+              <a:rPr lang="en-US" dirty="0"/>
               <a:t>Let’s do stuff</a:t>
             </a:r>
           </a:p>

</xml_diff>